<commit_message>
Add license to PPT slides
</commit_message>
<xml_diff>
--- a/slides/General introduction.pptx
+++ b/slides/General introduction.pptx
@@ -130,7 +130,7 @@
 <file path=ppt/revisionInfo.xml><?xml version="1.0" encoding="utf-8"?>
 <p1510:revInfo xmlns:a="http://schemas.openxmlformats.org/drawingml/2006/main" xmlns:r="http://schemas.openxmlformats.org/officeDocument/2006/relationships" xmlns:p1510="http://schemas.microsoft.com/office/powerpoint/2015/10/main">
   <p1510:revLst>
-    <p1510:client id="{627F9109-4080-0641-9C26-9E81570861CF}" v="1" dt="2025-11-20T08:33:03.340"/>
+    <p1510:client id="{627F9109-4080-0641-9C26-9E81570861CF}" v="8" dt="2025-11-20T08:34:15.085"/>
   </p1510:revLst>
 </p1510:revInfo>
 </file>
@@ -140,25 +140,33 @@
   <pc:docChgLst>
     <pc:chgData name="Robin Guillaume-Castel" userId="d00fb1e9-a1ad-4e14-9c90-8ac9508e8689" providerId="ADAL" clId="{9694768D-AE80-5C96-BE9F-2F4CFE4E5900}"/>
     <pc:docChg chg="modMainMaster">
-      <pc:chgData name="Robin Guillaume-Castel" userId="d00fb1e9-a1ad-4e14-9c90-8ac9508e8689" providerId="ADAL" clId="{9694768D-AE80-5C96-BE9F-2F4CFE4E5900}" dt="2025-11-20T08:33:03.339" v="0"/>
+      <pc:chgData name="Robin Guillaume-Castel" userId="d00fb1e9-a1ad-4e14-9c90-8ac9508e8689" providerId="ADAL" clId="{9694768D-AE80-5C96-BE9F-2F4CFE4E5900}" dt="2025-11-20T08:34:15.085" v="7"/>
       <pc:docMkLst>
         <pc:docMk/>
       </pc:docMkLst>
-      <pc:sldMasterChg chg="modSldLayout">
-        <pc:chgData name="Robin Guillaume-Castel" userId="d00fb1e9-a1ad-4e14-9c90-8ac9508e8689" providerId="ADAL" clId="{9694768D-AE80-5C96-BE9F-2F4CFE4E5900}" dt="2025-11-20T08:33:03.339" v="0"/>
+      <pc:sldMasterChg chg="addSp modSp modSldLayout">
+        <pc:chgData name="Robin Guillaume-Castel" userId="d00fb1e9-a1ad-4e14-9c90-8ac9508e8689" providerId="ADAL" clId="{9694768D-AE80-5C96-BE9F-2F4CFE4E5900}" dt="2025-11-20T08:34:15.085" v="7"/>
         <pc:sldMasterMkLst>
           <pc:docMk/>
           <pc:sldMasterMk cId="1765427073" sldId="2147483648"/>
         </pc:sldMasterMkLst>
-        <pc:sldLayoutChg chg="addSp">
-          <pc:chgData name="Robin Guillaume-Castel" userId="d00fb1e9-a1ad-4e14-9c90-8ac9508e8689" providerId="ADAL" clId="{9694768D-AE80-5C96-BE9F-2F4CFE4E5900}" dt="2025-11-20T08:33:03.339" v="0"/>
+        <pc:picChg chg="add mod">
+          <ac:chgData name="Robin Guillaume-Castel" userId="d00fb1e9-a1ad-4e14-9c90-8ac9508e8689" providerId="ADAL" clId="{9694768D-AE80-5C96-BE9F-2F4CFE4E5900}" dt="2025-11-20T08:34:15.085" v="7"/>
+          <ac:picMkLst>
+            <pc:docMk/>
+            <pc:sldMasterMk cId="1765427073" sldId="2147483648"/>
+            <ac:picMk id="10" creationId="{82A7780E-42B6-2B31-48EB-C091BB575916}"/>
+          </ac:picMkLst>
+        </pc:picChg>
+        <pc:sldLayoutChg chg="addSp delSp modSp">
+          <pc:chgData name="Robin Guillaume-Castel" userId="d00fb1e9-a1ad-4e14-9c90-8ac9508e8689" providerId="ADAL" clId="{9694768D-AE80-5C96-BE9F-2F4CFE4E5900}" dt="2025-11-20T08:34:13.873" v="6" actId="21"/>
           <pc:sldLayoutMkLst>
             <pc:docMk/>
             <pc:sldMasterMk cId="1765427073" sldId="2147483648"/>
             <pc:sldLayoutMk cId="155734712" sldId="2147483649"/>
           </pc:sldLayoutMkLst>
-          <pc:picChg chg="add">
-            <ac:chgData name="Robin Guillaume-Castel" userId="d00fb1e9-a1ad-4e14-9c90-8ac9508e8689" providerId="ADAL" clId="{9694768D-AE80-5C96-BE9F-2F4CFE4E5900}" dt="2025-11-20T08:33:03.339" v="0"/>
+          <pc:picChg chg="add del mod">
+            <ac:chgData name="Robin Guillaume-Castel" userId="d00fb1e9-a1ad-4e14-9c90-8ac9508e8689" providerId="ADAL" clId="{9694768D-AE80-5C96-BE9F-2F4CFE4E5900}" dt="2025-11-20T08:34:13.873" v="6" actId="21"/>
             <ac:picMkLst>
               <pc:docMk/>
               <pc:sldMasterMk cId="1765427073" sldId="2147483648"/>
@@ -796,53 +804,6 @@
           </a:p>
         </p:txBody>
       </p:sp>
-      <p:pic>
-        <p:nvPicPr>
-          <p:cNvPr id="1026" name="Picture 2">
-            <a:extLst>
-              <a:ext uri="{FF2B5EF4-FFF2-40B4-BE49-F238E27FC236}">
-                <a16:creationId xmlns:a16="http://schemas.microsoft.com/office/drawing/2014/main" id="{73760664-7074-95FA-CD57-476BA4DBBF19}"/>
-              </a:ext>
-            </a:extLst>
-          </p:cNvPr>
-          <p:cNvPicPr>
-            <a:picLocks noChangeAspect="1" noChangeArrowheads="1"/>
-          </p:cNvPicPr>
-          <p:nvPr userDrawn="1"/>
-        </p:nvPicPr>
-        <p:blipFill>
-          <a:blip r:embed="rId2">
-            <a:extLst>
-              <a:ext uri="{28A0092B-C50C-407E-A947-70E740481C1C}">
-                <a14:useLocalDpi xmlns:a14="http://schemas.microsoft.com/office/drawing/2010/main" val="0"/>
-              </a:ext>
-            </a:extLst>
-          </a:blip>
-          <a:srcRect/>
-          <a:stretch>
-            <a:fillRect/>
-          </a:stretch>
-        </p:blipFill>
-        <p:spPr bwMode="auto">
-          <a:xfrm>
-            <a:off x="3536950" y="2533650"/>
-            <a:ext cx="5118100" cy="1790700"/>
-          </a:xfrm>
-          <a:prstGeom prst="rect">
-            <a:avLst/>
-          </a:prstGeom>
-          <a:noFill/>
-          <a:extLst>
-            <a:ext uri="{909E8E84-426E-40DD-AFC4-6F175D3DCCD1}">
-              <a14:hiddenFill xmlns:a14="http://schemas.microsoft.com/office/drawing/2010/main">
-                <a:solidFill>
-                  <a:srgbClr val="FFFFFF"/>
-                </a:solidFill>
-              </a14:hiddenFill>
-            </a:ext>
-          </a:extLst>
-        </p:spPr>
-      </p:pic>
     </p:spTree>
     <p:extLst>
       <p:ext uri="{BB962C8B-B14F-4D97-AF65-F5344CB8AC3E}">
@@ -3758,6 +3719,53 @@
           </a:p>
         </p:txBody>
       </p:sp>
+      <p:pic>
+        <p:nvPicPr>
+          <p:cNvPr id="10" name="Picture 2">
+            <a:extLst>
+              <a:ext uri="{FF2B5EF4-FFF2-40B4-BE49-F238E27FC236}">
+                <a16:creationId xmlns:a16="http://schemas.microsoft.com/office/drawing/2014/main" id="{82A7780E-42B6-2B31-48EB-C091BB575916}"/>
+              </a:ext>
+            </a:extLst>
+          </p:cNvPr>
+          <p:cNvPicPr>
+            <a:picLocks noChangeAspect="1" noChangeArrowheads="1"/>
+          </p:cNvPicPr>
+          <p:nvPr userDrawn="1"/>
+        </p:nvPicPr>
+        <p:blipFill>
+          <a:blip r:embed="rId15">
+            <a:extLst>
+              <a:ext uri="{28A0092B-C50C-407E-A947-70E740481C1C}">
+                <a14:useLocalDpi xmlns:a14="http://schemas.microsoft.com/office/drawing/2010/main" val="0"/>
+              </a:ext>
+            </a:extLst>
+          </a:blip>
+          <a:srcRect/>
+          <a:stretch>
+            <a:fillRect/>
+          </a:stretch>
+        </p:blipFill>
+        <p:spPr bwMode="auto">
+          <a:xfrm>
+            <a:off x="8444688" y="6408248"/>
+            <a:ext cx="895254" cy="313227"/>
+          </a:xfrm>
+          <a:prstGeom prst="rect">
+            <a:avLst/>
+          </a:prstGeom>
+          <a:noFill/>
+          <a:extLst>
+            <a:ext uri="{909E8E84-426E-40DD-AFC4-6F175D3DCCD1}">
+              <a14:hiddenFill xmlns:a14="http://schemas.microsoft.com/office/drawing/2010/main">
+                <a:solidFill>
+                  <a:srgbClr val="FFFFFF"/>
+                </a:solidFill>
+              </a14:hiddenFill>
+            </a:ext>
+          </a:extLst>
+        </p:spPr>
+      </p:pic>
     </p:spTree>
     <p:extLst>
       <p:ext uri="{BB962C8B-B14F-4D97-AF65-F5344CB8AC3E}">

</xml_diff>